<commit_message>
clean up last slide
</commit_message>
<xml_diff>
--- a/presentations/00 - Setup_Cloud_Account.pptx
+++ b/presentations/00 - Setup_Cloud_Account.pptx
@@ -169,10 +169,9 @@
           </a:lstStyle>
           <a:p>
             <a:r>
-              <a:rPr lang="en-US" smtClean="0"/>
+              <a:rPr lang="en-US"/>
               <a:t>Click to edit Master title style</a:t>
             </a:r>
-            <a:endParaRPr lang="en-US"/>
           </a:p>
         </p:txBody>
       </p:sp>
@@ -234,10 +233,9 @@
           </a:lstStyle>
           <a:p>
             <a:r>
-              <a:rPr lang="en-US" smtClean="0"/>
+              <a:rPr lang="en-US"/>
               <a:t>Click to edit Master subtitle style</a:t>
             </a:r>
-            <a:endParaRPr lang="en-US"/>
           </a:p>
         </p:txBody>
       </p:sp>
@@ -258,7 +256,7 @@
           <a:p>
             <a:fld id="{75330C06-28F3-488D-8058-8ECCA2508925}" type="datetimeFigureOut">
               <a:rPr lang="en-US" smtClean="0"/>
-              <a:t>4/22/2019</a:t>
+              <a:t>7/3/20</a:t>
             </a:fld>
             <a:endParaRPr lang="en-US"/>
           </a:p>
@@ -352,10 +350,9 @@
           <a:lstStyle/>
           <a:p>
             <a:r>
-              <a:rPr lang="en-US" smtClean="0"/>
+              <a:rPr lang="en-US"/>
               <a:t>Click to edit Master title style</a:t>
             </a:r>
-            <a:endParaRPr lang="en-US"/>
           </a:p>
         </p:txBody>
       </p:sp>
@@ -376,38 +373,37 @@
           <a:p>
             <a:pPr lvl="0"/>
             <a:r>
-              <a:rPr lang="en-US" smtClean="0"/>
+              <a:rPr lang="en-US"/>
               <a:t>Click to edit Master text styles</a:t>
             </a:r>
           </a:p>
           <a:p>
             <a:pPr lvl="1"/>
             <a:r>
-              <a:rPr lang="en-US" smtClean="0"/>
+              <a:rPr lang="en-US"/>
               <a:t>Second level</a:t>
             </a:r>
           </a:p>
           <a:p>
             <a:pPr lvl="2"/>
             <a:r>
-              <a:rPr lang="en-US" smtClean="0"/>
+              <a:rPr lang="en-US"/>
               <a:t>Third level</a:t>
             </a:r>
           </a:p>
           <a:p>
             <a:pPr lvl="3"/>
             <a:r>
-              <a:rPr lang="en-US" smtClean="0"/>
+              <a:rPr lang="en-US"/>
               <a:t>Fourth level</a:t>
             </a:r>
           </a:p>
           <a:p>
             <a:pPr lvl="4"/>
             <a:r>
-              <a:rPr lang="en-US" smtClean="0"/>
+              <a:rPr lang="en-US"/>
               <a:t>Fifth level</a:t>
             </a:r>
-            <a:endParaRPr lang="en-US"/>
           </a:p>
         </p:txBody>
       </p:sp>
@@ -428,7 +424,7 @@
           <a:p>
             <a:fld id="{75330C06-28F3-488D-8058-8ECCA2508925}" type="datetimeFigureOut">
               <a:rPr lang="en-US" smtClean="0"/>
-              <a:t>4/22/2019</a:t>
+              <a:t>7/3/20</a:t>
             </a:fld>
             <a:endParaRPr lang="en-US"/>
           </a:p>
@@ -527,10 +523,9 @@
           <a:lstStyle/>
           <a:p>
             <a:r>
-              <a:rPr lang="en-US" smtClean="0"/>
+              <a:rPr lang="en-US"/>
               <a:t>Click to edit Master title style</a:t>
             </a:r>
-            <a:endParaRPr lang="en-US"/>
           </a:p>
         </p:txBody>
       </p:sp>
@@ -556,38 +551,37 @@
           <a:p>
             <a:pPr lvl="0"/>
             <a:r>
-              <a:rPr lang="en-US" smtClean="0"/>
+              <a:rPr lang="en-US"/>
               <a:t>Click to edit Master text styles</a:t>
             </a:r>
           </a:p>
           <a:p>
             <a:pPr lvl="1"/>
             <a:r>
-              <a:rPr lang="en-US" smtClean="0"/>
+              <a:rPr lang="en-US"/>
               <a:t>Second level</a:t>
             </a:r>
           </a:p>
           <a:p>
             <a:pPr lvl="2"/>
             <a:r>
-              <a:rPr lang="en-US" smtClean="0"/>
+              <a:rPr lang="en-US"/>
               <a:t>Third level</a:t>
             </a:r>
           </a:p>
           <a:p>
             <a:pPr lvl="3"/>
             <a:r>
-              <a:rPr lang="en-US" smtClean="0"/>
+              <a:rPr lang="en-US"/>
               <a:t>Fourth level</a:t>
             </a:r>
           </a:p>
           <a:p>
             <a:pPr lvl="4"/>
             <a:r>
-              <a:rPr lang="en-US" smtClean="0"/>
+              <a:rPr lang="en-US"/>
               <a:t>Fifth level</a:t>
             </a:r>
-            <a:endParaRPr lang="en-US"/>
           </a:p>
         </p:txBody>
       </p:sp>
@@ -608,7 +602,7 @@
           <a:p>
             <a:fld id="{75330C06-28F3-488D-8058-8ECCA2508925}" type="datetimeFigureOut">
               <a:rPr lang="en-US" smtClean="0"/>
-              <a:t>4/22/2019</a:t>
+              <a:t>7/3/20</a:t>
             </a:fld>
             <a:endParaRPr lang="en-US"/>
           </a:p>
@@ -702,10 +696,9 @@
           <a:lstStyle/>
           <a:p>
             <a:r>
-              <a:rPr lang="en-US" smtClean="0"/>
+              <a:rPr lang="en-US"/>
               <a:t>Click to edit Master title style</a:t>
             </a:r>
-            <a:endParaRPr lang="en-US"/>
           </a:p>
         </p:txBody>
       </p:sp>
@@ -726,38 +719,37 @@
           <a:p>
             <a:pPr lvl="0"/>
             <a:r>
-              <a:rPr lang="en-US" smtClean="0"/>
+              <a:rPr lang="en-US"/>
               <a:t>Click to edit Master text styles</a:t>
             </a:r>
           </a:p>
           <a:p>
             <a:pPr lvl="1"/>
             <a:r>
-              <a:rPr lang="en-US" smtClean="0"/>
+              <a:rPr lang="en-US"/>
               <a:t>Second level</a:t>
             </a:r>
           </a:p>
           <a:p>
             <a:pPr lvl="2"/>
             <a:r>
-              <a:rPr lang="en-US" smtClean="0"/>
+              <a:rPr lang="en-US"/>
               <a:t>Third level</a:t>
             </a:r>
           </a:p>
           <a:p>
             <a:pPr lvl="3"/>
             <a:r>
-              <a:rPr lang="en-US" smtClean="0"/>
+              <a:rPr lang="en-US"/>
               <a:t>Fourth level</a:t>
             </a:r>
           </a:p>
           <a:p>
             <a:pPr lvl="4"/>
             <a:r>
-              <a:rPr lang="en-US" smtClean="0"/>
+              <a:rPr lang="en-US"/>
               <a:t>Fifth level</a:t>
             </a:r>
-            <a:endParaRPr lang="en-US"/>
           </a:p>
         </p:txBody>
       </p:sp>
@@ -778,7 +770,7 @@
           <a:p>
             <a:fld id="{75330C06-28F3-488D-8058-8ECCA2508925}" type="datetimeFigureOut">
               <a:rPr lang="en-US" smtClean="0"/>
-              <a:t>4/22/2019</a:t>
+              <a:t>7/3/20</a:t>
             </a:fld>
             <a:endParaRPr lang="en-US"/>
           </a:p>
@@ -881,10 +873,9 @@
           </a:lstStyle>
           <a:p>
             <a:r>
-              <a:rPr lang="en-US" smtClean="0"/>
+              <a:rPr lang="en-US"/>
               <a:t>Click to edit Master title style</a:t>
             </a:r>
-            <a:endParaRPr lang="en-US"/>
           </a:p>
         </p:txBody>
       </p:sp>
@@ -1001,7 +992,7 @@
           <a:p>
             <a:pPr lvl="0"/>
             <a:r>
-              <a:rPr lang="en-US" smtClean="0"/>
+              <a:rPr lang="en-US"/>
               <a:t>Click to edit Master text styles</a:t>
             </a:r>
           </a:p>
@@ -1024,7 +1015,7 @@
           <a:p>
             <a:fld id="{75330C06-28F3-488D-8058-8ECCA2508925}" type="datetimeFigureOut">
               <a:rPr lang="en-US" smtClean="0"/>
-              <a:t>4/22/2019</a:t>
+              <a:t>7/3/20</a:t>
             </a:fld>
             <a:endParaRPr lang="en-US"/>
           </a:p>
@@ -1118,10 +1109,9 @@
           <a:lstStyle/>
           <a:p>
             <a:r>
-              <a:rPr lang="en-US" smtClean="0"/>
+              <a:rPr lang="en-US"/>
               <a:t>Click to edit Master title style</a:t>
             </a:r>
-            <a:endParaRPr lang="en-US"/>
           </a:p>
         </p:txBody>
       </p:sp>
@@ -1147,38 +1137,37 @@
           <a:p>
             <a:pPr lvl="0"/>
             <a:r>
-              <a:rPr lang="en-US" smtClean="0"/>
+              <a:rPr lang="en-US"/>
               <a:t>Click to edit Master text styles</a:t>
             </a:r>
           </a:p>
           <a:p>
             <a:pPr lvl="1"/>
             <a:r>
-              <a:rPr lang="en-US" smtClean="0"/>
+              <a:rPr lang="en-US"/>
               <a:t>Second level</a:t>
             </a:r>
           </a:p>
           <a:p>
             <a:pPr lvl="2"/>
             <a:r>
-              <a:rPr lang="en-US" smtClean="0"/>
+              <a:rPr lang="en-US"/>
               <a:t>Third level</a:t>
             </a:r>
           </a:p>
           <a:p>
             <a:pPr lvl="3"/>
             <a:r>
-              <a:rPr lang="en-US" smtClean="0"/>
+              <a:rPr lang="en-US"/>
               <a:t>Fourth level</a:t>
             </a:r>
           </a:p>
           <a:p>
             <a:pPr lvl="4"/>
             <a:r>
-              <a:rPr lang="en-US" smtClean="0"/>
+              <a:rPr lang="en-US"/>
               <a:t>Fifth level</a:t>
             </a:r>
-            <a:endParaRPr lang="en-US"/>
           </a:p>
         </p:txBody>
       </p:sp>
@@ -1204,38 +1193,37 @@
           <a:p>
             <a:pPr lvl="0"/>
             <a:r>
-              <a:rPr lang="en-US" smtClean="0"/>
+              <a:rPr lang="en-US"/>
               <a:t>Click to edit Master text styles</a:t>
             </a:r>
           </a:p>
           <a:p>
             <a:pPr lvl="1"/>
             <a:r>
-              <a:rPr lang="en-US" smtClean="0"/>
+              <a:rPr lang="en-US"/>
               <a:t>Second level</a:t>
             </a:r>
           </a:p>
           <a:p>
             <a:pPr lvl="2"/>
             <a:r>
-              <a:rPr lang="en-US" smtClean="0"/>
+              <a:rPr lang="en-US"/>
               <a:t>Third level</a:t>
             </a:r>
           </a:p>
           <a:p>
             <a:pPr lvl="3"/>
             <a:r>
-              <a:rPr lang="en-US" smtClean="0"/>
+              <a:rPr lang="en-US"/>
               <a:t>Fourth level</a:t>
             </a:r>
           </a:p>
           <a:p>
             <a:pPr lvl="4"/>
             <a:r>
-              <a:rPr lang="en-US" smtClean="0"/>
+              <a:rPr lang="en-US"/>
               <a:t>Fifth level</a:t>
             </a:r>
-            <a:endParaRPr lang="en-US"/>
           </a:p>
         </p:txBody>
       </p:sp>
@@ -1256,7 +1244,7 @@
           <a:p>
             <a:fld id="{75330C06-28F3-488D-8058-8ECCA2508925}" type="datetimeFigureOut">
               <a:rPr lang="en-US" smtClean="0"/>
-              <a:t>4/22/2019</a:t>
+              <a:t>7/3/20</a:t>
             </a:fld>
             <a:endParaRPr lang="en-US"/>
           </a:p>
@@ -1355,10 +1343,9 @@
           <a:lstStyle/>
           <a:p>
             <a:r>
-              <a:rPr lang="en-US" smtClean="0"/>
+              <a:rPr lang="en-US"/>
               <a:t>Click to edit Master title style</a:t>
             </a:r>
-            <a:endParaRPr lang="en-US"/>
           </a:p>
         </p:txBody>
       </p:sp>
@@ -1421,7 +1408,7 @@
           <a:p>
             <a:pPr lvl="0"/>
             <a:r>
-              <a:rPr lang="en-US" smtClean="0"/>
+              <a:rPr lang="en-US"/>
               <a:t>Click to edit Master text styles</a:t>
             </a:r>
           </a:p>
@@ -1449,38 +1436,37 @@
           <a:p>
             <a:pPr lvl="0"/>
             <a:r>
-              <a:rPr lang="en-US" smtClean="0"/>
+              <a:rPr lang="en-US"/>
               <a:t>Click to edit Master text styles</a:t>
             </a:r>
           </a:p>
           <a:p>
             <a:pPr lvl="1"/>
             <a:r>
-              <a:rPr lang="en-US" smtClean="0"/>
+              <a:rPr lang="en-US"/>
               <a:t>Second level</a:t>
             </a:r>
           </a:p>
           <a:p>
             <a:pPr lvl="2"/>
             <a:r>
-              <a:rPr lang="en-US" smtClean="0"/>
+              <a:rPr lang="en-US"/>
               <a:t>Third level</a:t>
             </a:r>
           </a:p>
           <a:p>
             <a:pPr lvl="3"/>
             <a:r>
-              <a:rPr lang="en-US" smtClean="0"/>
+              <a:rPr lang="en-US"/>
               <a:t>Fourth level</a:t>
             </a:r>
           </a:p>
           <a:p>
             <a:pPr lvl="4"/>
             <a:r>
-              <a:rPr lang="en-US" smtClean="0"/>
+              <a:rPr lang="en-US"/>
               <a:t>Fifth level</a:t>
             </a:r>
-            <a:endParaRPr lang="en-US"/>
           </a:p>
         </p:txBody>
       </p:sp>
@@ -1543,7 +1529,7 @@
           <a:p>
             <a:pPr lvl="0"/>
             <a:r>
-              <a:rPr lang="en-US" smtClean="0"/>
+              <a:rPr lang="en-US"/>
               <a:t>Click to edit Master text styles</a:t>
             </a:r>
           </a:p>
@@ -1571,38 +1557,37 @@
           <a:p>
             <a:pPr lvl="0"/>
             <a:r>
-              <a:rPr lang="en-US" smtClean="0"/>
+              <a:rPr lang="en-US"/>
               <a:t>Click to edit Master text styles</a:t>
             </a:r>
           </a:p>
           <a:p>
             <a:pPr lvl="1"/>
             <a:r>
-              <a:rPr lang="en-US" smtClean="0"/>
+              <a:rPr lang="en-US"/>
               <a:t>Second level</a:t>
             </a:r>
           </a:p>
           <a:p>
             <a:pPr lvl="2"/>
             <a:r>
-              <a:rPr lang="en-US" smtClean="0"/>
+              <a:rPr lang="en-US"/>
               <a:t>Third level</a:t>
             </a:r>
           </a:p>
           <a:p>
             <a:pPr lvl="3"/>
             <a:r>
-              <a:rPr lang="en-US" smtClean="0"/>
+              <a:rPr lang="en-US"/>
               <a:t>Fourth level</a:t>
             </a:r>
           </a:p>
           <a:p>
             <a:pPr lvl="4"/>
             <a:r>
-              <a:rPr lang="en-US" smtClean="0"/>
+              <a:rPr lang="en-US"/>
               <a:t>Fifth level</a:t>
             </a:r>
-            <a:endParaRPr lang="en-US"/>
           </a:p>
         </p:txBody>
       </p:sp>
@@ -1623,7 +1608,7 @@
           <a:p>
             <a:fld id="{75330C06-28F3-488D-8058-8ECCA2508925}" type="datetimeFigureOut">
               <a:rPr lang="en-US" smtClean="0"/>
-              <a:t>4/22/2019</a:t>
+              <a:t>7/3/20</a:t>
             </a:fld>
             <a:endParaRPr lang="en-US"/>
           </a:p>
@@ -1717,10 +1702,9 @@
           <a:lstStyle/>
           <a:p>
             <a:r>
-              <a:rPr lang="en-US" smtClean="0"/>
+              <a:rPr lang="en-US"/>
               <a:t>Click to edit Master title style</a:t>
             </a:r>
-            <a:endParaRPr lang="en-US"/>
           </a:p>
         </p:txBody>
       </p:sp>
@@ -1741,7 +1725,7 @@
           <a:p>
             <a:fld id="{75330C06-28F3-488D-8058-8ECCA2508925}" type="datetimeFigureOut">
               <a:rPr lang="en-US" smtClean="0"/>
-              <a:t>4/22/2019</a:t>
+              <a:t>7/3/20</a:t>
             </a:fld>
             <a:endParaRPr lang="en-US"/>
           </a:p>
@@ -1836,7 +1820,7 @@
           <a:p>
             <a:fld id="{75330C06-28F3-488D-8058-8ECCA2508925}" type="datetimeFigureOut">
               <a:rPr lang="en-US" smtClean="0"/>
-              <a:t>4/22/2019</a:t>
+              <a:t>7/3/20</a:t>
             </a:fld>
             <a:endParaRPr lang="en-US"/>
           </a:p>
@@ -1939,10 +1923,9 @@
           </a:lstStyle>
           <a:p>
             <a:r>
-              <a:rPr lang="en-US" smtClean="0"/>
+              <a:rPr lang="en-US"/>
               <a:t>Click to edit Master title style</a:t>
             </a:r>
-            <a:endParaRPr lang="en-US"/>
           </a:p>
         </p:txBody>
       </p:sp>
@@ -1996,38 +1979,37 @@
           <a:p>
             <a:pPr lvl="0"/>
             <a:r>
-              <a:rPr lang="en-US" smtClean="0"/>
+              <a:rPr lang="en-US"/>
               <a:t>Click to edit Master text styles</a:t>
             </a:r>
           </a:p>
           <a:p>
             <a:pPr lvl="1"/>
             <a:r>
-              <a:rPr lang="en-US" smtClean="0"/>
+              <a:rPr lang="en-US"/>
               <a:t>Second level</a:t>
             </a:r>
           </a:p>
           <a:p>
             <a:pPr lvl="2"/>
             <a:r>
-              <a:rPr lang="en-US" smtClean="0"/>
+              <a:rPr lang="en-US"/>
               <a:t>Third level</a:t>
             </a:r>
           </a:p>
           <a:p>
             <a:pPr lvl="3"/>
             <a:r>
-              <a:rPr lang="en-US" smtClean="0"/>
+              <a:rPr lang="en-US"/>
               <a:t>Fourth level</a:t>
             </a:r>
           </a:p>
           <a:p>
             <a:pPr lvl="4"/>
             <a:r>
-              <a:rPr lang="en-US" smtClean="0"/>
+              <a:rPr lang="en-US"/>
               <a:t>Fifth level</a:t>
             </a:r>
-            <a:endParaRPr lang="en-US"/>
           </a:p>
         </p:txBody>
       </p:sp>
@@ -2090,7 +2072,7 @@
           <a:p>
             <a:pPr lvl="0"/>
             <a:r>
-              <a:rPr lang="en-US" smtClean="0"/>
+              <a:rPr lang="en-US"/>
               <a:t>Click to edit Master text styles</a:t>
             </a:r>
           </a:p>
@@ -2113,7 +2095,7 @@
           <a:p>
             <a:fld id="{75330C06-28F3-488D-8058-8ECCA2508925}" type="datetimeFigureOut">
               <a:rPr lang="en-US" smtClean="0"/>
-              <a:t>4/22/2019</a:t>
+              <a:t>7/3/20</a:t>
             </a:fld>
             <a:endParaRPr lang="en-US"/>
           </a:p>
@@ -2216,10 +2198,9 @@
           </a:lstStyle>
           <a:p>
             <a:r>
-              <a:rPr lang="en-US" smtClean="0"/>
+              <a:rPr lang="en-US"/>
               <a:t>Click to edit Master title style</a:t>
             </a:r>
-            <a:endParaRPr lang="en-US"/>
           </a:p>
         </p:txBody>
       </p:sp>
@@ -2343,7 +2324,7 @@
           <a:p>
             <a:pPr lvl="0"/>
             <a:r>
-              <a:rPr lang="en-US" smtClean="0"/>
+              <a:rPr lang="en-US"/>
               <a:t>Click to edit Master text styles</a:t>
             </a:r>
           </a:p>
@@ -2366,7 +2347,7 @@
           <a:p>
             <a:fld id="{75330C06-28F3-488D-8058-8ECCA2508925}" type="datetimeFigureOut">
               <a:rPr lang="en-US" smtClean="0"/>
-              <a:t>4/22/2019</a:t>
+              <a:t>7/3/20</a:t>
             </a:fld>
             <a:endParaRPr lang="en-US"/>
           </a:p>
@@ -2475,10 +2456,9 @@
           <a:lstStyle/>
           <a:p>
             <a:r>
-              <a:rPr lang="en-US" smtClean="0"/>
+              <a:rPr lang="en-US"/>
               <a:t>Click to edit Master title style</a:t>
             </a:r>
-            <a:endParaRPr lang="en-US"/>
           </a:p>
         </p:txBody>
       </p:sp>
@@ -2509,38 +2489,37 @@
           <a:p>
             <a:pPr lvl="0"/>
             <a:r>
-              <a:rPr lang="en-US" smtClean="0"/>
+              <a:rPr lang="en-US"/>
               <a:t>Click to edit Master text styles</a:t>
             </a:r>
           </a:p>
           <a:p>
             <a:pPr lvl="1"/>
             <a:r>
-              <a:rPr lang="en-US" smtClean="0"/>
+              <a:rPr lang="en-US"/>
               <a:t>Second level</a:t>
             </a:r>
           </a:p>
           <a:p>
             <a:pPr lvl="2"/>
             <a:r>
-              <a:rPr lang="en-US" smtClean="0"/>
+              <a:rPr lang="en-US"/>
               <a:t>Third level</a:t>
             </a:r>
           </a:p>
           <a:p>
             <a:pPr lvl="3"/>
             <a:r>
-              <a:rPr lang="en-US" smtClean="0"/>
+              <a:rPr lang="en-US"/>
               <a:t>Fourth level</a:t>
             </a:r>
           </a:p>
           <a:p>
             <a:pPr lvl="4"/>
             <a:r>
-              <a:rPr lang="en-US" smtClean="0"/>
+              <a:rPr lang="en-US"/>
               <a:t>Fifth level</a:t>
             </a:r>
-            <a:endParaRPr lang="en-US"/>
           </a:p>
         </p:txBody>
       </p:sp>
@@ -2579,7 +2558,7 @@
           <a:p>
             <a:fld id="{75330C06-28F3-488D-8058-8ECCA2508925}" type="datetimeFigureOut">
               <a:rPr lang="en-US" smtClean="0"/>
-              <a:t>4/22/2019</a:t>
+              <a:t>7/3/20</a:t>
             </a:fld>
             <a:endParaRPr lang="en-US"/>
           </a:p>
@@ -3006,7 +2985,7 @@
           <a:p>
             <a:pPr algn="ctr"/>
             <a:r>
-              <a:rPr lang="en-US" dirty="0" smtClean="0">
+              <a:rPr lang="en-US" dirty="0">
                 <a:hlinkClick r:id="rId2"/>
               </a:rPr>
               <a:t>https://rstudio.cloud/</a:t>
@@ -3205,7 +3184,7 @@
           <a:lstStyle/>
           <a:p>
             <a:r>
-              <a:rPr lang="en-US" dirty="0" smtClean="0"/>
+              <a:rPr lang="en-US" dirty="0"/>
               <a:t>Sign up for an account</a:t>
             </a:r>
           </a:p>
@@ -3265,7 +3244,7 @@
               <a:buNone/>
             </a:pPr>
             <a:r>
-              <a:rPr lang="en-US" dirty="0" smtClean="0"/>
+              <a:rPr lang="en-US" dirty="0"/>
               <a:t>Sign up using whichever method is most convenient.</a:t>
             </a:r>
           </a:p>
@@ -3274,10 +3253,9 @@
               <a:buNone/>
             </a:pPr>
             <a:r>
-              <a:rPr lang="en-US" dirty="0" smtClean="0"/>
+              <a:rPr lang="en-US" dirty="0"/>
               <a:t>Make note of login name/password for future use</a:t>
             </a:r>
-            <a:endParaRPr lang="en-US" dirty="0"/>
           </a:p>
         </p:txBody>
       </p:sp>
@@ -3468,7 +3446,7 @@
           <a:lstStyle/>
           <a:p>
             <a:r>
-              <a:rPr lang="en-US" dirty="0" smtClean="0"/>
+              <a:rPr lang="en-US" dirty="0"/>
               <a:t>Confirm to create account</a:t>
             </a:r>
           </a:p>
@@ -3528,25 +3506,6 @@
           </a:prstGeom>
         </p:spPr>
       </p:pic>
-      <p:sp>
-        <p:nvSpPr>
-          <p:cNvPr id="2" name="Title 1"/>
-          <p:cNvSpPr>
-            <a:spLocks noGrp="1"/>
-          </p:cNvSpPr>
-          <p:nvPr>
-            <p:ph type="title"/>
-          </p:nvPr>
-        </p:nvSpPr>
-        <p:spPr/>
-        <p:txBody>
-          <a:bodyPr/>
-          <a:lstStyle/>
-          <a:p>
-            <a:endParaRPr lang="en-US"/>
-          </a:p>
-        </p:txBody>
-      </p:sp>
       <p:pic>
         <p:nvPicPr>
           <p:cNvPr id="5" name="Content Placeholder 4"/>

</xml_diff>